<commit_message>
Tidied up Server and WebsiteClient projects
</commit_message>
<xml_diff>
--- a/WebSocket.pptx
+++ b/WebSocket.pptx
@@ -12,14 +12,19 @@
     <p:sldId id="260" r:id="rId6"/>
     <p:sldId id="261" r:id="rId7"/>
     <p:sldId id="262" r:id="rId8"/>
-    <p:sldId id="263" r:id="rId9"/>
-    <p:sldId id="264" r:id="rId10"/>
-    <p:sldId id="265" r:id="rId11"/>
-    <p:sldId id="266" r:id="rId12"/>
-    <p:sldId id="267" r:id="rId13"/>
-    <p:sldId id="268" r:id="rId14"/>
-    <p:sldId id="269" r:id="rId15"/>
-    <p:sldId id="270" r:id="rId16"/>
+    <p:sldId id="271" r:id="rId9"/>
+    <p:sldId id="263" r:id="rId10"/>
+    <p:sldId id="264" r:id="rId11"/>
+    <p:sldId id="265" r:id="rId12"/>
+    <p:sldId id="266" r:id="rId13"/>
+    <p:sldId id="272" r:id="rId14"/>
+    <p:sldId id="267" r:id="rId15"/>
+    <p:sldId id="268" r:id="rId16"/>
+    <p:sldId id="273" r:id="rId17"/>
+    <p:sldId id="269" r:id="rId18"/>
+    <p:sldId id="270" r:id="rId19"/>
+    <p:sldId id="274" r:id="rId20"/>
+    <p:sldId id="275" r:id="rId21"/>
   </p:sldIdLst>
   <p:sldSz cx="9144000" cy="6858000" type="screen4x3"/>
   <p:notesSz cx="6858000" cy="9144000"/>
@@ -3878,7 +3883,11 @@
           <a:p>
             <a:r>
               <a:rPr lang="en-GB" dirty="0" smtClean="0"/>
-              <a:t>Introduction to WebSocket</a:t>
+              <a:t>Introduction to </a:t>
+            </a:r>
+            <a:r>
+              <a:rPr lang="en-GB" dirty="0" smtClean="0"/>
+              <a:t>WebSocket and SignalR</a:t>
             </a:r>
             <a:endParaRPr lang="en-GB" dirty="0"/>
           </a:p>
@@ -3983,51 +3992,55 @@
               <a:rPr lang="en-GB" dirty="0" smtClean="0">
                 <a:latin typeface="+mj-lt"/>
               </a:rPr>
-              <a:t>Although WebSocket was originally intended for browser-based applications, client </a:t>
+              <a:t>As </a:t>
             </a:r>
             <a:r>
               <a:rPr lang="en-GB" dirty="0">
                 <a:latin typeface="+mj-lt"/>
               </a:rPr>
-              <a:t>desktop applications written in .NET </a:t>
+              <a:t>communication is done over TCP port </a:t>
             </a:r>
             <a:r>
               <a:rPr lang="en-GB" dirty="0" smtClean="0">
                 <a:latin typeface="+mj-lt"/>
               </a:rPr>
-              <a:t>can also </a:t>
+              <a:t>80/443, </a:t>
             </a:r>
             <a:r>
               <a:rPr lang="en-GB" dirty="0">
                 <a:latin typeface="+mj-lt"/>
               </a:rPr>
-              <a:t>use </a:t>
+              <a:t>this benefits those environments where non-web Internet communication is blocked by a firewall</a:t>
             </a:r>
             <a:r>
               <a:rPr lang="en-GB" dirty="0" smtClean="0">
                 <a:latin typeface="+mj-lt"/>
               </a:rPr>
-              <a:t>WebSocket </a:t>
-            </a:r>
-            <a:r>
-              <a:rPr lang="en-GB" dirty="0">
-                <a:latin typeface="+mj-lt"/>
-              </a:rPr>
-              <a:t>with a library called WebSocket4Net.</a:t>
-            </a:r>
+              <a:t>.</a:t>
+            </a:r>
+            <a:endParaRPr lang="en-GB" dirty="0">
+              <a:latin typeface="+mj-lt"/>
+            </a:endParaRPr>
           </a:p>
         </p:txBody>
       </p:sp>
     </p:spTree>
     <p:extLst>
       <p:ext uri="{BB962C8B-B14F-4D97-AF65-F5344CB8AC3E}">
-        <p14:creationId xmlns:p14="http://schemas.microsoft.com/office/powerpoint/2010/main" val="1326885323"/>
+        <p14:creationId xmlns:p14="http://schemas.microsoft.com/office/powerpoint/2010/main" val="814109854"/>
       </p:ext>
     </p:extLst>
   </p:cSld>
   <p:clrMapOvr>
     <a:masterClrMapping/>
   </p:clrMapOvr>
+  <p:timing>
+    <p:tnLst>
+      <p:par>
+        <p:cTn id="1" dur="indefinite" restart="never" nodeType="tmRoot"/>
+      </p:par>
+    </p:tnLst>
+  </p:timing>
 </p:sld>
 </file>
 
@@ -4065,13 +4078,8 @@
           <a:p>
             <a:r>
               <a:rPr lang="en-GB" dirty="0"/>
-              <a:t>What are the </a:t>
-            </a:r>
-            <a:r>
-              <a:rPr lang="en-GB" dirty="0" smtClean="0"/>
-              <a:t>drawbacks?</a:t>
-            </a:r>
-            <a:endParaRPr lang="en-GB" dirty="0"/>
+              <a:t>What are the benefits?</a:t>
+            </a:r>
           </a:p>
         </p:txBody>
       </p:sp>
@@ -4096,185 +4104,58 @@
               <a:rPr lang="en-GB" dirty="0" smtClean="0">
                 <a:latin typeface="+mj-lt"/>
               </a:rPr>
+              <a:t>Although WebSocket was originally intended for browser-based applications, client </a:t>
+            </a:r>
+            <a:r>
+              <a:rPr lang="en-GB" dirty="0">
+                <a:latin typeface="+mj-lt"/>
+              </a:rPr>
+              <a:t>desktop applications written in .NET </a:t>
+            </a:r>
+            <a:r>
+              <a:rPr lang="en-GB" dirty="0" smtClean="0">
+                <a:latin typeface="+mj-lt"/>
+              </a:rPr>
+              <a:t>can also </a:t>
+            </a:r>
+            <a:r>
+              <a:rPr lang="en-GB" dirty="0">
+                <a:latin typeface="+mj-lt"/>
+              </a:rPr>
+              <a:t>use </a:t>
+            </a:r>
+            <a:r>
+              <a:rPr lang="en-GB" dirty="0" smtClean="0">
+                <a:latin typeface="+mj-lt"/>
+              </a:rPr>
               <a:t>WebSocket </a:t>
             </a:r>
             <a:r>
               <a:rPr lang="en-GB" dirty="0">
                 <a:latin typeface="+mj-lt"/>
               </a:rPr>
-              <a:t>is a fairly new technology and is only supported in newer </a:t>
-            </a:r>
-            <a:r>
-              <a:rPr lang="en-GB" dirty="0" smtClean="0">
-                <a:latin typeface="+mj-lt"/>
-              </a:rPr>
-              <a:t>browsers:</a:t>
-            </a:r>
-            <a:br>
-              <a:rPr lang="en-GB" dirty="0" smtClean="0">
-                <a:latin typeface="+mj-lt"/>
-              </a:rPr>
-            </a:br>
-            <a:r>
-              <a:rPr lang="en-GB" dirty="0" smtClean="0">
-                <a:latin typeface="+mj-lt"/>
-              </a:rPr>
-              <a:t>IE10+</a:t>
-            </a:r>
-            <a:br>
-              <a:rPr lang="en-GB" dirty="0" smtClean="0">
-                <a:latin typeface="+mj-lt"/>
-              </a:rPr>
-            </a:br>
-            <a:r>
-              <a:rPr lang="en-GB" dirty="0" smtClean="0">
-                <a:latin typeface="+mj-lt"/>
-              </a:rPr>
-              <a:t>Firefox </a:t>
-            </a:r>
-            <a:r>
-              <a:rPr lang="en-GB" dirty="0">
-                <a:latin typeface="+mj-lt"/>
-              </a:rPr>
-              <a:t>31</a:t>
-            </a:r>
-            <a:r>
-              <a:rPr lang="en-GB" dirty="0" smtClean="0">
-                <a:latin typeface="+mj-lt"/>
-              </a:rPr>
-              <a:t>+</a:t>
-            </a:r>
-            <a:br>
-              <a:rPr lang="en-GB" dirty="0" smtClean="0">
-                <a:latin typeface="+mj-lt"/>
-              </a:rPr>
-            </a:br>
-            <a:r>
-              <a:rPr lang="en-GB" dirty="0" smtClean="0">
-                <a:latin typeface="+mj-lt"/>
-              </a:rPr>
-              <a:t>Chrome </a:t>
-            </a:r>
-            <a:r>
-              <a:rPr lang="en-GB" dirty="0">
-                <a:latin typeface="+mj-lt"/>
-              </a:rPr>
-              <a:t>31</a:t>
-            </a:r>
-            <a:r>
-              <a:rPr lang="en-GB" dirty="0" smtClean="0">
-                <a:latin typeface="+mj-lt"/>
-              </a:rPr>
-              <a:t>+</a:t>
-            </a:r>
-            <a:br>
-              <a:rPr lang="en-GB" dirty="0" smtClean="0">
-                <a:latin typeface="+mj-lt"/>
-              </a:rPr>
-            </a:br>
-            <a:r>
-              <a:rPr lang="en-GB" dirty="0" smtClean="0">
-                <a:latin typeface="+mj-lt"/>
-              </a:rPr>
-              <a:t>Chrome </a:t>
-            </a:r>
-            <a:r>
-              <a:rPr lang="en-GB" dirty="0">
-                <a:latin typeface="+mj-lt"/>
-              </a:rPr>
-              <a:t>for Android 42</a:t>
-            </a:r>
-            <a:r>
-              <a:rPr lang="en-GB" dirty="0" smtClean="0">
-                <a:latin typeface="+mj-lt"/>
-              </a:rPr>
-              <a:t>+</a:t>
-            </a:r>
-            <a:br>
-              <a:rPr lang="en-GB" dirty="0" smtClean="0">
-                <a:latin typeface="+mj-lt"/>
-              </a:rPr>
-            </a:br>
-            <a:r>
-              <a:rPr lang="en-GB" dirty="0" smtClean="0">
-                <a:latin typeface="+mj-lt"/>
-              </a:rPr>
-              <a:t>Safari </a:t>
-            </a:r>
-            <a:r>
-              <a:rPr lang="en-GB" dirty="0">
-                <a:latin typeface="+mj-lt"/>
-              </a:rPr>
-              <a:t>7</a:t>
-            </a:r>
-            <a:r>
-              <a:rPr lang="en-GB" dirty="0" smtClean="0">
-                <a:latin typeface="+mj-lt"/>
-              </a:rPr>
-              <a:t>+</a:t>
-            </a:r>
-            <a:br>
-              <a:rPr lang="en-GB" dirty="0" smtClean="0">
-                <a:latin typeface="+mj-lt"/>
-              </a:rPr>
-            </a:br>
-            <a:r>
-              <a:rPr lang="en-GB" dirty="0" smtClean="0">
-                <a:latin typeface="+mj-lt"/>
-              </a:rPr>
-              <a:t>Opera </a:t>
-            </a:r>
-            <a:r>
-              <a:rPr lang="en-GB" dirty="0">
-                <a:latin typeface="+mj-lt"/>
-              </a:rPr>
-              <a:t>30+ (not yet on Opera Mini</a:t>
-            </a:r>
-            <a:r>
-              <a:rPr lang="en-GB" dirty="0" smtClean="0">
-                <a:latin typeface="+mj-lt"/>
-              </a:rPr>
-              <a:t>)</a:t>
-            </a:r>
-            <a:br>
-              <a:rPr lang="en-GB" dirty="0" smtClean="0">
-                <a:latin typeface="+mj-lt"/>
-              </a:rPr>
-            </a:br>
-            <a:r>
-              <a:rPr lang="en-GB" dirty="0" smtClean="0">
-                <a:latin typeface="+mj-lt"/>
-              </a:rPr>
-              <a:t>Android </a:t>
-            </a:r>
-            <a:r>
-              <a:rPr lang="en-GB" dirty="0">
-                <a:latin typeface="+mj-lt"/>
-              </a:rPr>
-              <a:t>Native Browser 4.4</a:t>
-            </a:r>
-            <a:r>
-              <a:rPr lang="en-GB" dirty="0" smtClean="0">
-                <a:latin typeface="+mj-lt"/>
-              </a:rPr>
-              <a:t>+</a:t>
-            </a:r>
-            <a:endParaRPr lang="en-GB" dirty="0">
-              <a:latin typeface="+mj-lt"/>
-            </a:endParaRPr>
+              <a:t>with a library called WebSocket4Net.</a:t>
+            </a:r>
           </a:p>
         </p:txBody>
       </p:sp>
     </p:spTree>
     <p:extLst>
       <p:ext uri="{BB962C8B-B14F-4D97-AF65-F5344CB8AC3E}">
-        <p14:creationId xmlns:p14="http://schemas.microsoft.com/office/powerpoint/2010/main" val="1475924860"/>
+        <p14:creationId xmlns:p14="http://schemas.microsoft.com/office/powerpoint/2010/main" val="1326885323"/>
       </p:ext>
     </p:extLst>
   </p:cSld>
   <p:clrMapOvr>
     <a:masterClrMapping/>
   </p:clrMapOvr>
+  <p:timing>
+    <p:tnLst>
+      <p:par>
+        <p:cTn id="1" dur="indefinite" restart="never" nodeType="tmRoot"/>
+      </p:par>
+    </p:tnLst>
+  </p:timing>
 </p:sld>
 </file>
 
@@ -4339,42 +4220,6 @@
           </a:bodyPr>
           <a:lstStyle/>
           <a:p>
-            <a:r>
-              <a:rPr lang="en-GB" dirty="0">
-                <a:latin typeface="+mj-lt"/>
-              </a:rPr>
-              <a:t>To host </a:t>
-            </a:r>
-            <a:r>
-              <a:rPr lang="en-GB" dirty="0" smtClean="0">
-                <a:latin typeface="+mj-lt"/>
-              </a:rPr>
-              <a:t>a WebSocket application on </a:t>
-            </a:r>
-            <a:r>
-              <a:rPr lang="en-GB" dirty="0">
-                <a:latin typeface="+mj-lt"/>
-              </a:rPr>
-              <a:t>Windows IIS, only Windows Server 2012+ and Windows </a:t>
-            </a:r>
-            <a:r>
-              <a:rPr lang="en-GB" dirty="0" smtClean="0">
-                <a:latin typeface="+mj-lt"/>
-              </a:rPr>
-              <a:t>8+ </a:t>
-            </a:r>
-            <a:r>
-              <a:rPr lang="en-GB" dirty="0">
-                <a:latin typeface="+mj-lt"/>
-              </a:rPr>
-              <a:t>are supported</a:t>
-            </a:r>
-            <a:r>
-              <a:rPr lang="en-GB" dirty="0" smtClean="0">
-                <a:latin typeface="+mj-lt"/>
-              </a:rPr>
-              <a:t>.</a:t>
-            </a:r>
             <a:endParaRPr lang="en-GB" dirty="0">
               <a:latin typeface="+mj-lt"/>
             </a:endParaRPr>
@@ -4384,13 +4229,20 @@
     </p:spTree>
     <p:extLst>
       <p:ext uri="{BB962C8B-B14F-4D97-AF65-F5344CB8AC3E}">
-        <p14:creationId xmlns:p14="http://schemas.microsoft.com/office/powerpoint/2010/main" val="2929290839"/>
+        <p14:creationId xmlns:p14="http://schemas.microsoft.com/office/powerpoint/2010/main" val="1475924860"/>
       </p:ext>
     </p:extLst>
   </p:cSld>
   <p:clrMapOvr>
     <a:masterClrMapping/>
   </p:clrMapOvr>
+  <p:timing>
+    <p:tnLst>
+      <p:par>
+        <p:cTn id="1" dur="indefinite" restart="never" nodeType="tmRoot"/>
+      </p:par>
+    </p:tnLst>
+  </p:timing>
 </p:sld>
 </file>
 
@@ -4428,11 +4280,11 @@
           <a:p>
             <a:r>
               <a:rPr lang="en-GB" dirty="0"/>
-              <a:t>What </a:t>
+              <a:t>What are the </a:t>
             </a:r>
             <a:r>
               <a:rPr lang="en-GB" dirty="0" smtClean="0"/>
-              <a:t>is SignalR?</a:t>
+              <a:t>drawbacks?</a:t>
             </a:r>
             <a:endParaRPr lang="en-GB" dirty="0"/>
           </a:p>
@@ -4456,36 +4308,195 @@
           <a:lstStyle/>
           <a:p>
             <a:r>
+              <a:rPr lang="en-GB" dirty="0" smtClean="0">
+                <a:latin typeface="+mj-lt"/>
+              </a:rPr>
+              <a:t>WebSocket </a:t>
+            </a:r>
+            <a:r>
               <a:rPr lang="en-GB" dirty="0">
                 <a:latin typeface="+mj-lt"/>
               </a:rPr>
-              <a:t>SignalR is an ASP.NET library that can be used to add real-time functionality to web applications. </a:t>
+              <a:t>is a fairly new technology and is only supported in newer </a:t>
             </a:r>
             <a:r>
               <a:rPr lang="en-GB" dirty="0" smtClean="0">
                 <a:latin typeface="+mj-lt"/>
               </a:rPr>
-              <a:t>This is </a:t>
+              <a:t>browsers:</a:t>
+            </a:r>
+            <a:br>
+              <a:rPr lang="en-GB" dirty="0" smtClean="0">
+                <a:latin typeface="+mj-lt"/>
+              </a:rPr>
+            </a:br>
+            <a:r>
+              <a:rPr lang="en-GB" dirty="0" smtClean="0">
+                <a:latin typeface="+mj-lt"/>
+              </a:rPr>
+              <a:t>IE10+</a:t>
+            </a:r>
+            <a:br>
+              <a:rPr lang="en-GB" dirty="0" smtClean="0">
+                <a:latin typeface="+mj-lt"/>
+              </a:rPr>
+            </a:br>
+            <a:r>
+              <a:rPr lang="en-GB" dirty="0" smtClean="0">
+                <a:latin typeface="+mj-lt"/>
+              </a:rPr>
+              <a:t>Firefox </a:t>
             </a:r>
             <a:r>
               <a:rPr lang="en-GB" dirty="0">
                 <a:latin typeface="+mj-lt"/>
               </a:rPr>
-              <a:t>the ability to have server-side code push content to the connected clients as it happens, in real-time.</a:t>
-            </a:r>
+              <a:t>31</a:t>
+            </a:r>
+            <a:r>
+              <a:rPr lang="en-GB" dirty="0" smtClean="0">
+                <a:latin typeface="+mj-lt"/>
+              </a:rPr>
+              <a:t>+</a:t>
+            </a:r>
+            <a:br>
+              <a:rPr lang="en-GB" dirty="0" smtClean="0">
+                <a:latin typeface="+mj-lt"/>
+              </a:rPr>
+            </a:br>
+            <a:r>
+              <a:rPr lang="en-GB" dirty="0" smtClean="0">
+                <a:latin typeface="+mj-lt"/>
+              </a:rPr>
+              <a:t>Chrome </a:t>
+            </a:r>
+            <a:r>
+              <a:rPr lang="en-GB" dirty="0">
+                <a:latin typeface="+mj-lt"/>
+              </a:rPr>
+              <a:t>31</a:t>
+            </a:r>
+            <a:r>
+              <a:rPr lang="en-GB" dirty="0" smtClean="0">
+                <a:latin typeface="+mj-lt"/>
+              </a:rPr>
+              <a:t>+</a:t>
+            </a:r>
+            <a:br>
+              <a:rPr lang="en-GB" dirty="0" smtClean="0">
+                <a:latin typeface="+mj-lt"/>
+              </a:rPr>
+            </a:br>
+            <a:r>
+              <a:rPr lang="en-GB" dirty="0" smtClean="0">
+                <a:latin typeface="+mj-lt"/>
+              </a:rPr>
+              <a:t>Chrome </a:t>
+            </a:r>
+            <a:r>
+              <a:rPr lang="en-GB" dirty="0">
+                <a:latin typeface="+mj-lt"/>
+              </a:rPr>
+              <a:t>for Android 42</a:t>
+            </a:r>
+            <a:r>
+              <a:rPr lang="en-GB" dirty="0" smtClean="0">
+                <a:latin typeface="+mj-lt"/>
+              </a:rPr>
+              <a:t>+</a:t>
+            </a:r>
+            <a:br>
+              <a:rPr lang="en-GB" dirty="0" smtClean="0">
+                <a:latin typeface="+mj-lt"/>
+              </a:rPr>
+            </a:br>
+            <a:r>
+              <a:rPr lang="en-GB" dirty="0" smtClean="0">
+                <a:latin typeface="+mj-lt"/>
+              </a:rPr>
+              <a:t>Safari </a:t>
+            </a:r>
+            <a:r>
+              <a:rPr lang="en-GB" dirty="0">
+                <a:latin typeface="+mj-lt"/>
+              </a:rPr>
+              <a:t>7</a:t>
+            </a:r>
+            <a:r>
+              <a:rPr lang="en-GB" dirty="0" smtClean="0">
+                <a:latin typeface="+mj-lt"/>
+              </a:rPr>
+              <a:t>+</a:t>
+            </a:r>
+            <a:br>
+              <a:rPr lang="en-GB" dirty="0" smtClean="0">
+                <a:latin typeface="+mj-lt"/>
+              </a:rPr>
+            </a:br>
+            <a:r>
+              <a:rPr lang="en-GB" dirty="0" smtClean="0">
+                <a:latin typeface="+mj-lt"/>
+              </a:rPr>
+              <a:t>Opera </a:t>
+            </a:r>
+            <a:r>
+              <a:rPr lang="en-GB" dirty="0">
+                <a:latin typeface="+mj-lt"/>
+              </a:rPr>
+              <a:t>30+ (not yet on Opera Mini</a:t>
+            </a:r>
+            <a:r>
+              <a:rPr lang="en-GB" dirty="0" smtClean="0">
+                <a:latin typeface="+mj-lt"/>
+              </a:rPr>
+              <a:t>)</a:t>
+            </a:r>
+            <a:br>
+              <a:rPr lang="en-GB" dirty="0" smtClean="0">
+                <a:latin typeface="+mj-lt"/>
+              </a:rPr>
+            </a:br>
+            <a:r>
+              <a:rPr lang="en-GB" dirty="0" smtClean="0">
+                <a:latin typeface="+mj-lt"/>
+              </a:rPr>
+              <a:t>Android </a:t>
+            </a:r>
+            <a:r>
+              <a:rPr lang="en-GB" dirty="0">
+                <a:latin typeface="+mj-lt"/>
+              </a:rPr>
+              <a:t>Native Browser 4.4</a:t>
+            </a:r>
+            <a:r>
+              <a:rPr lang="en-GB" dirty="0" smtClean="0">
+                <a:latin typeface="+mj-lt"/>
+              </a:rPr>
+              <a:t>+</a:t>
+            </a:r>
+            <a:endParaRPr lang="en-GB" dirty="0">
+              <a:latin typeface="+mj-lt"/>
+            </a:endParaRPr>
           </a:p>
         </p:txBody>
       </p:sp>
     </p:spTree>
     <p:extLst>
       <p:ext uri="{BB962C8B-B14F-4D97-AF65-F5344CB8AC3E}">
-        <p14:creationId xmlns:p14="http://schemas.microsoft.com/office/powerpoint/2010/main" val="3101281605"/>
+        <p14:creationId xmlns:p14="http://schemas.microsoft.com/office/powerpoint/2010/main" val="274400970"/>
       </p:ext>
     </p:extLst>
   </p:cSld>
   <p:clrMapOvr>
     <a:masterClrMapping/>
   </p:clrMapOvr>
+  <p:timing>
+    <p:tnLst>
+      <p:par>
+        <p:cTn id="1" dur="indefinite" restart="never" nodeType="tmRoot"/>
+      </p:par>
+    </p:tnLst>
+  </p:timing>
 </p:sld>
 </file>
 
@@ -4523,11 +4534,11 @@
           <a:p>
             <a:r>
               <a:rPr lang="en-GB" dirty="0"/>
-              <a:t>What </a:t>
+              <a:t>What are the </a:t>
             </a:r>
             <a:r>
               <a:rPr lang="en-GB" dirty="0" smtClean="0"/>
-              <a:t>is SignalR?</a:t>
+              <a:t>drawbacks?</a:t>
             </a:r>
             <a:endParaRPr lang="en-GB" dirty="0"/>
           </a:p>
@@ -4554,37 +4565,37 @@
               <a:rPr lang="en-GB" dirty="0">
                 <a:latin typeface="+mj-lt"/>
               </a:rPr>
-              <a:t>SignalR takes advantage of </a:t>
+              <a:t>To host </a:t>
             </a:r>
             <a:r>
               <a:rPr lang="en-GB" dirty="0" smtClean="0">
                 <a:latin typeface="+mj-lt"/>
               </a:rPr>
-              <a:t>WebSocket </a:t>
+              <a:t>a WebSocket application on </a:t>
             </a:r>
             <a:r>
               <a:rPr lang="en-GB" dirty="0">
                 <a:latin typeface="+mj-lt"/>
               </a:rPr>
-              <a:t>under the covers when it's available, and gracefully falls back to other techniques and technologies when it isn't, while the application code remains the same. This means we can run </a:t>
+              <a:t>Windows IIS, only Windows Server 2012+ and Windows </a:t>
             </a:r>
             <a:r>
               <a:rPr lang="en-GB" dirty="0" smtClean="0">
                 <a:latin typeface="+mj-lt"/>
               </a:rPr>
-              <a:t>WebSocket-like applications on Windows Server 2008 and </a:t>
+              <a:t>8+ </a:t>
             </a:r>
             <a:r>
               <a:rPr lang="en-GB" dirty="0">
                 <a:latin typeface="+mj-lt"/>
               </a:rPr>
-              <a:t>Windows 7 </a:t>
+              <a:t>are supported</a:t>
             </a:r>
             <a:r>
               <a:rPr lang="en-GB" dirty="0" smtClean="0">
                 <a:latin typeface="+mj-lt"/>
               </a:rPr>
-              <a:t>IIS.</a:t>
+              <a:t>.</a:t>
             </a:r>
             <a:endParaRPr lang="en-GB" dirty="0">
               <a:latin typeface="+mj-lt"/>
@@ -4595,13 +4606,20 @@
     </p:spTree>
     <p:extLst>
       <p:ext uri="{BB962C8B-B14F-4D97-AF65-F5344CB8AC3E}">
-        <p14:creationId xmlns:p14="http://schemas.microsoft.com/office/powerpoint/2010/main" val="995183584"/>
+        <p14:creationId xmlns:p14="http://schemas.microsoft.com/office/powerpoint/2010/main" val="2929290839"/>
       </p:ext>
     </p:extLst>
   </p:cSld>
   <p:clrMapOvr>
     <a:masterClrMapping/>
   </p:clrMapOvr>
+  <p:timing>
+    <p:tnLst>
+      <p:par>
+        <p:cTn id="1" dur="indefinite" restart="never" nodeType="tmRoot"/>
+      </p:par>
+    </p:tnLst>
+  </p:timing>
 </p:sld>
 </file>
 
@@ -4634,14 +4652,16 @@
         </p:nvSpPr>
         <p:spPr/>
         <p:txBody>
-          <a:bodyPr>
-            <a:normAutofit fontScale="90000"/>
-          </a:bodyPr>
-          <a:lstStyle/>
-          <a:p>
+          <a:bodyPr/>
+          <a:lstStyle/>
+          <a:p>
+            <a:r>
+              <a:rPr lang="en-GB" dirty="0"/>
+              <a:t>What </a:t>
+            </a:r>
             <a:r>
               <a:rPr lang="en-GB" dirty="0" smtClean="0"/>
-              <a:t>WebSocket demo with a simple SignalR chat application</a:t>
+              <a:t>is SignalR?</a:t>
             </a:r>
             <a:endParaRPr lang="en-GB" dirty="0"/>
           </a:p>
@@ -4664,47 +4684,328 @@
           </a:bodyPr>
           <a:lstStyle/>
           <a:p>
-            <a:r>
-              <a:rPr lang="en-GB" dirty="0" smtClean="0">
-                <a:latin typeface="+mj-lt"/>
-              </a:rPr>
-              <a:t>Here follows a simple SignalR chat </a:t>
-            </a:r>
-            <a:r>
-              <a:rPr lang="en-GB" dirty="0" smtClean="0">
-                <a:latin typeface="+mj-lt"/>
-              </a:rPr>
-              <a:t>application to demonstrate how WebSocket applications can be used.</a:t>
-            </a:r>
-            <a:endParaRPr lang="en-GB" dirty="0" smtClean="0">
+            <a:endParaRPr lang="en-GB" dirty="0">
               <a:latin typeface="+mj-lt"/>
             </a:endParaRPr>
           </a:p>
-          <a:p>
+        </p:txBody>
+      </p:sp>
+    </p:spTree>
+    <p:extLst>
+      <p:ext uri="{BB962C8B-B14F-4D97-AF65-F5344CB8AC3E}">
+        <p14:creationId xmlns:p14="http://schemas.microsoft.com/office/powerpoint/2010/main" val="3101281605"/>
+      </p:ext>
+    </p:extLst>
+  </p:cSld>
+  <p:clrMapOvr>
+    <a:masterClrMapping/>
+  </p:clrMapOvr>
+  <p:timing>
+    <p:tnLst>
+      <p:par>
+        <p:cTn id="1" dur="indefinite" restart="never" nodeType="tmRoot"/>
+      </p:par>
+    </p:tnLst>
+  </p:timing>
+</p:sld>
+</file>
+
+<file path=ppt/slides/slide16.xml><?xml version="1.0" encoding="utf-8"?>
+<p:sld xmlns:a="http://schemas.openxmlformats.org/drawingml/2006/main" xmlns:r="http://schemas.openxmlformats.org/officeDocument/2006/relationships" xmlns:p="http://schemas.openxmlformats.org/presentationml/2006/main">
+  <p:cSld>
+    <p:spTree>
+      <p:nvGrpSpPr>
+        <p:cNvPr id="1" name=""/>
+        <p:cNvGrpSpPr/>
+        <p:nvPr/>
+      </p:nvGrpSpPr>
+      <p:grpSpPr>
+        <a:xfrm>
+          <a:off x="0" y="0"/>
+          <a:ext cx="0" cy="0"/>
+          <a:chOff x="0" y="0"/>
+          <a:chExt cx="0" cy="0"/>
+        </a:xfrm>
+      </p:grpSpPr>
+      <p:sp>
+        <p:nvSpPr>
+          <p:cNvPr id="2" name="Title 1"/>
+          <p:cNvSpPr>
+            <a:spLocks noGrp="1"/>
+          </p:cNvSpPr>
+          <p:nvPr>
+            <p:ph type="title"/>
+          </p:nvPr>
+        </p:nvSpPr>
+        <p:spPr/>
+        <p:txBody>
+          <a:bodyPr/>
+          <a:lstStyle/>
+          <a:p>
+            <a:r>
+              <a:rPr lang="en-GB" dirty="0"/>
+              <a:t>What </a:t>
+            </a:r>
+            <a:r>
+              <a:rPr lang="en-GB" dirty="0" smtClean="0"/>
+              <a:t>is SignalR?</a:t>
+            </a:r>
+            <a:endParaRPr lang="en-GB" dirty="0"/>
+          </a:p>
+        </p:txBody>
+      </p:sp>
+      <p:sp>
+        <p:nvSpPr>
+          <p:cNvPr id="3" name="Content Placeholder 2"/>
+          <p:cNvSpPr>
+            <a:spLocks noGrp="1"/>
+          </p:cNvSpPr>
+          <p:nvPr>
+            <p:ph idx="1"/>
+          </p:nvPr>
+        </p:nvSpPr>
+        <p:spPr/>
+        <p:txBody>
+          <a:bodyPr>
+            <a:normAutofit/>
+          </a:bodyPr>
+          <a:lstStyle/>
+          <a:p>
+            <a:r>
+              <a:rPr lang="en-GB" dirty="0">
+                <a:latin typeface="+mj-lt"/>
+              </a:rPr>
+              <a:t>SignalR is an ASP.NET library that can be used to add real-time functionality to web applications. </a:t>
+            </a:r>
             <a:r>
               <a:rPr lang="en-GB" dirty="0" smtClean="0">
                 <a:latin typeface="+mj-lt"/>
               </a:rPr>
-              <a:t>We will </a:t>
-            </a:r>
-            <a:r>
-              <a:rPr lang="en-GB" smtClean="0">
-                <a:latin typeface="+mj-lt"/>
-              </a:rPr>
-              <a:t>be using </a:t>
+              <a:t>It gives the ability </a:t>
+            </a:r>
+            <a:r>
+              <a:rPr lang="en-GB" dirty="0">
+                <a:latin typeface="+mj-lt"/>
+              </a:rPr>
+              <a:t>to have server-side code push content to the connected clients as it happens, in real-time.</a:t>
+            </a:r>
+          </a:p>
+        </p:txBody>
+      </p:sp>
+    </p:spTree>
+    <p:extLst>
+      <p:ext uri="{BB962C8B-B14F-4D97-AF65-F5344CB8AC3E}">
+        <p14:creationId xmlns:p14="http://schemas.microsoft.com/office/powerpoint/2010/main" val="2693733847"/>
+      </p:ext>
+    </p:extLst>
+  </p:cSld>
+  <p:clrMapOvr>
+    <a:masterClrMapping/>
+  </p:clrMapOvr>
+  <p:timing>
+    <p:tnLst>
+      <p:par>
+        <p:cTn id="1" dur="indefinite" restart="never" nodeType="tmRoot"/>
+      </p:par>
+    </p:tnLst>
+  </p:timing>
+</p:sld>
+</file>
+
+<file path=ppt/slides/slide17.xml><?xml version="1.0" encoding="utf-8"?>
+<p:sld xmlns:a="http://schemas.openxmlformats.org/drawingml/2006/main" xmlns:r="http://schemas.openxmlformats.org/officeDocument/2006/relationships" xmlns:p="http://schemas.openxmlformats.org/presentationml/2006/main">
+  <p:cSld>
+    <p:spTree>
+      <p:nvGrpSpPr>
+        <p:cNvPr id="1" name=""/>
+        <p:cNvGrpSpPr/>
+        <p:nvPr/>
+      </p:nvGrpSpPr>
+      <p:grpSpPr>
+        <a:xfrm>
+          <a:off x="0" y="0"/>
+          <a:ext cx="0" cy="0"/>
+          <a:chOff x="0" y="0"/>
+          <a:chExt cx="0" cy="0"/>
+        </a:xfrm>
+      </p:grpSpPr>
+      <p:sp>
+        <p:nvSpPr>
+          <p:cNvPr id="2" name="Title 1"/>
+          <p:cNvSpPr>
+            <a:spLocks noGrp="1"/>
+          </p:cNvSpPr>
+          <p:nvPr>
+            <p:ph type="title"/>
+          </p:nvPr>
+        </p:nvSpPr>
+        <p:spPr/>
+        <p:txBody>
+          <a:bodyPr/>
+          <a:lstStyle/>
+          <a:p>
+            <a:r>
+              <a:rPr lang="en-GB" dirty="0"/>
+              <a:t>What </a:t>
+            </a:r>
+            <a:r>
+              <a:rPr lang="en-GB" dirty="0" smtClean="0"/>
+              <a:t>is SignalR?</a:t>
+            </a:r>
+            <a:endParaRPr lang="en-GB" dirty="0"/>
+          </a:p>
+        </p:txBody>
+      </p:sp>
+      <p:sp>
+        <p:nvSpPr>
+          <p:cNvPr id="3" name="Content Placeholder 2"/>
+          <p:cNvSpPr>
+            <a:spLocks noGrp="1"/>
+          </p:cNvSpPr>
+          <p:nvPr>
+            <p:ph idx="1"/>
+          </p:nvPr>
+        </p:nvSpPr>
+        <p:spPr/>
+        <p:txBody>
+          <a:bodyPr>
+            <a:normAutofit/>
+          </a:bodyPr>
+          <a:lstStyle/>
+          <a:p>
+            <a:r>
+              <a:rPr lang="en-GB" dirty="0">
+                <a:latin typeface="+mj-lt"/>
+              </a:rPr>
+              <a:t>SignalR takes advantage of </a:t>
             </a:r>
             <a:r>
               <a:rPr lang="en-GB" dirty="0" smtClean="0">
                 <a:latin typeface="+mj-lt"/>
               </a:rPr>
-              <a:t>Windows 7 IIS, so won’t actually be using true WebSocket functionality, although the effect will be the </a:t>
+              <a:t>WebSocket </a:t>
+            </a:r>
+            <a:r>
+              <a:rPr lang="en-GB" dirty="0">
+                <a:latin typeface="+mj-lt"/>
+              </a:rPr>
+              <a:t>under the covers when it's available, and gracefully falls back to other techniques and technologies when it isn't, while the application code remains the same. This means we can run </a:t>
             </a:r>
             <a:r>
               <a:rPr lang="en-GB" dirty="0" smtClean="0">
                 <a:latin typeface="+mj-lt"/>
               </a:rPr>
-              <a:t>same, as SignalR silently falls back to older technologies when WebSocket isn’t available.</a:t>
-            </a:r>
+              <a:t>WebSocket-like applications </a:t>
+            </a:r>
+            <a:r>
+              <a:rPr lang="en-GB" dirty="0" smtClean="0">
+                <a:latin typeface="+mj-lt"/>
+              </a:rPr>
+              <a:t>on IIS on </a:t>
+            </a:r>
+            <a:r>
+              <a:rPr lang="en-GB" dirty="0" smtClean="0">
+                <a:latin typeface="+mj-lt"/>
+              </a:rPr>
+              <a:t>Windows Server 2008 and </a:t>
+            </a:r>
+            <a:r>
+              <a:rPr lang="en-GB" dirty="0">
+                <a:latin typeface="+mj-lt"/>
+              </a:rPr>
+              <a:t>Windows </a:t>
+            </a:r>
+            <a:r>
+              <a:rPr lang="en-GB" dirty="0" smtClean="0">
+                <a:latin typeface="+mj-lt"/>
+              </a:rPr>
+              <a:t>7.</a:t>
+            </a:r>
+            <a:endParaRPr lang="en-GB" dirty="0">
+              <a:latin typeface="+mj-lt"/>
+            </a:endParaRPr>
+          </a:p>
+        </p:txBody>
+      </p:sp>
+    </p:spTree>
+    <p:extLst>
+      <p:ext uri="{BB962C8B-B14F-4D97-AF65-F5344CB8AC3E}">
+        <p14:creationId xmlns:p14="http://schemas.microsoft.com/office/powerpoint/2010/main" val="995183584"/>
+      </p:ext>
+    </p:extLst>
+  </p:cSld>
+  <p:clrMapOvr>
+    <a:masterClrMapping/>
+  </p:clrMapOvr>
+  <p:timing>
+    <p:tnLst>
+      <p:par>
+        <p:cTn id="1" dur="indefinite" restart="never" nodeType="tmRoot"/>
+      </p:par>
+    </p:tnLst>
+  </p:timing>
+</p:sld>
+</file>
+
+<file path=ppt/slides/slide18.xml><?xml version="1.0" encoding="utf-8"?>
+<p:sld xmlns:a="http://schemas.openxmlformats.org/drawingml/2006/main" xmlns:r="http://schemas.openxmlformats.org/officeDocument/2006/relationships" xmlns:p="http://schemas.openxmlformats.org/presentationml/2006/main">
+  <p:cSld>
+    <p:spTree>
+      <p:nvGrpSpPr>
+        <p:cNvPr id="1" name=""/>
+        <p:cNvGrpSpPr/>
+        <p:nvPr/>
+      </p:nvGrpSpPr>
+      <p:grpSpPr>
+        <a:xfrm>
+          <a:off x="0" y="0"/>
+          <a:ext cx="0" cy="0"/>
+          <a:chOff x="0" y="0"/>
+          <a:chExt cx="0" cy="0"/>
+        </a:xfrm>
+      </p:grpSpPr>
+      <p:sp>
+        <p:nvSpPr>
+          <p:cNvPr id="2" name="Title 1"/>
+          <p:cNvSpPr>
+            <a:spLocks noGrp="1"/>
+          </p:cNvSpPr>
+          <p:nvPr>
+            <p:ph type="title"/>
+          </p:nvPr>
+        </p:nvSpPr>
+        <p:spPr/>
+        <p:txBody>
+          <a:bodyPr>
+            <a:normAutofit/>
+          </a:bodyPr>
+          <a:lstStyle/>
+          <a:p>
+            <a:r>
+              <a:rPr lang="en-GB" dirty="0"/>
+              <a:t>SignalR demo chat application</a:t>
+            </a:r>
+            <a:endParaRPr lang="en-GB" dirty="0"/>
+          </a:p>
+        </p:txBody>
+      </p:sp>
+      <p:sp>
+        <p:nvSpPr>
+          <p:cNvPr id="3" name="Content Placeholder 2"/>
+          <p:cNvSpPr>
+            <a:spLocks noGrp="1"/>
+          </p:cNvSpPr>
+          <p:nvPr>
+            <p:ph idx="1"/>
+          </p:nvPr>
+        </p:nvSpPr>
+        <p:spPr/>
+        <p:txBody>
+          <a:bodyPr>
+            <a:normAutofit/>
+          </a:bodyPr>
+          <a:lstStyle/>
+          <a:p>
             <a:endParaRPr lang="en-GB" dirty="0" smtClean="0">
               <a:latin typeface="+mj-lt"/>
             </a:endParaRPr>
@@ -4721,6 +5022,120 @@
   <p:clrMapOvr>
     <a:masterClrMapping/>
   </p:clrMapOvr>
+  <p:timing>
+    <p:tnLst>
+      <p:par>
+        <p:cTn id="1" dur="indefinite" restart="never" nodeType="tmRoot"/>
+      </p:par>
+    </p:tnLst>
+  </p:timing>
+</p:sld>
+</file>
+
+<file path=ppt/slides/slide19.xml><?xml version="1.0" encoding="utf-8"?>
+<p:sld xmlns:a="http://schemas.openxmlformats.org/drawingml/2006/main" xmlns:r="http://schemas.openxmlformats.org/officeDocument/2006/relationships" xmlns:p="http://schemas.openxmlformats.org/presentationml/2006/main">
+  <p:cSld>
+    <p:spTree>
+      <p:nvGrpSpPr>
+        <p:cNvPr id="1" name=""/>
+        <p:cNvGrpSpPr/>
+        <p:nvPr/>
+      </p:nvGrpSpPr>
+      <p:grpSpPr>
+        <a:xfrm>
+          <a:off x="0" y="0"/>
+          <a:ext cx="0" cy="0"/>
+          <a:chOff x="0" y="0"/>
+          <a:chExt cx="0" cy="0"/>
+        </a:xfrm>
+      </p:grpSpPr>
+      <p:sp>
+        <p:nvSpPr>
+          <p:cNvPr id="2" name="Title 1"/>
+          <p:cNvSpPr>
+            <a:spLocks noGrp="1"/>
+          </p:cNvSpPr>
+          <p:nvPr>
+            <p:ph type="title"/>
+          </p:nvPr>
+        </p:nvSpPr>
+        <p:spPr/>
+        <p:txBody>
+          <a:bodyPr>
+            <a:normAutofit/>
+          </a:bodyPr>
+          <a:lstStyle/>
+          <a:p>
+            <a:r>
+              <a:rPr lang="en-GB" dirty="0" smtClean="0"/>
+              <a:t>SignalR demo chat </a:t>
+            </a:r>
+            <a:r>
+              <a:rPr lang="en-GB" dirty="0" smtClean="0"/>
+              <a:t>application</a:t>
+            </a:r>
+            <a:endParaRPr lang="en-GB" dirty="0"/>
+          </a:p>
+        </p:txBody>
+      </p:sp>
+      <p:sp>
+        <p:nvSpPr>
+          <p:cNvPr id="3" name="Content Placeholder 2"/>
+          <p:cNvSpPr>
+            <a:spLocks noGrp="1"/>
+          </p:cNvSpPr>
+          <p:nvPr>
+            <p:ph idx="1"/>
+          </p:nvPr>
+        </p:nvSpPr>
+        <p:spPr/>
+        <p:txBody>
+          <a:bodyPr>
+            <a:normAutofit/>
+          </a:bodyPr>
+          <a:lstStyle/>
+          <a:p>
+            <a:r>
+              <a:rPr lang="en-GB" dirty="0" smtClean="0">
+                <a:latin typeface="+mj-lt"/>
+              </a:rPr>
+              <a:t>Here’s </a:t>
+            </a:r>
+            <a:r>
+              <a:rPr lang="en-GB" dirty="0" smtClean="0">
+                <a:latin typeface="+mj-lt"/>
+              </a:rPr>
+              <a:t>a simple SignalR chat </a:t>
+            </a:r>
+            <a:r>
+              <a:rPr lang="en-GB" dirty="0" smtClean="0">
+                <a:latin typeface="+mj-lt"/>
+              </a:rPr>
+              <a:t>application to demonstrate how WebSocket applications can be used.</a:t>
+            </a:r>
+            <a:endParaRPr lang="en-GB" dirty="0" smtClean="0">
+              <a:latin typeface="+mj-lt"/>
+            </a:endParaRPr>
+          </a:p>
+        </p:txBody>
+      </p:sp>
+    </p:spTree>
+    <p:extLst>
+      <p:ext uri="{BB962C8B-B14F-4D97-AF65-F5344CB8AC3E}">
+        <p14:creationId xmlns:p14="http://schemas.microsoft.com/office/powerpoint/2010/main" val="2692855459"/>
+      </p:ext>
+    </p:extLst>
+  </p:cSld>
+  <p:clrMapOvr>
+    <a:masterClrMapping/>
+  </p:clrMapOvr>
+  <p:timing>
+    <p:tnLst>
+      <p:par>
+        <p:cTn id="1" dur="indefinite" restart="never" nodeType="tmRoot"/>
+      </p:par>
+    </p:tnLst>
+  </p:timing>
 </p:sld>
 </file>
 
@@ -4818,6 +5233,116 @@
     <p:extLst>
       <p:ext uri="{BB962C8B-B14F-4D97-AF65-F5344CB8AC3E}">
         <p14:creationId xmlns:p14="http://schemas.microsoft.com/office/powerpoint/2010/main" val="1105955166"/>
+      </p:ext>
+    </p:extLst>
+  </p:cSld>
+  <p:clrMapOvr>
+    <a:masterClrMapping/>
+  </p:clrMapOvr>
+  <p:timing>
+    <p:tnLst>
+      <p:par>
+        <p:cTn id="1" dur="indefinite" restart="never" nodeType="tmRoot"/>
+      </p:par>
+    </p:tnLst>
+  </p:timing>
+</p:sld>
+</file>
+
+<file path=ppt/slides/slide20.xml><?xml version="1.0" encoding="utf-8"?>
+<p:sld xmlns:a="http://schemas.openxmlformats.org/drawingml/2006/main" xmlns:r="http://schemas.openxmlformats.org/officeDocument/2006/relationships" xmlns:p="http://schemas.openxmlformats.org/presentationml/2006/main">
+  <p:cSld>
+    <p:spTree>
+      <p:nvGrpSpPr>
+        <p:cNvPr id="1" name=""/>
+        <p:cNvGrpSpPr/>
+        <p:nvPr/>
+      </p:nvGrpSpPr>
+      <p:grpSpPr>
+        <a:xfrm>
+          <a:off x="0" y="0"/>
+          <a:ext cx="0" cy="0"/>
+          <a:chOff x="0" y="0"/>
+          <a:chExt cx="0" cy="0"/>
+        </a:xfrm>
+      </p:grpSpPr>
+      <p:sp>
+        <p:nvSpPr>
+          <p:cNvPr id="2" name="Title 1"/>
+          <p:cNvSpPr>
+            <a:spLocks noGrp="1"/>
+          </p:cNvSpPr>
+          <p:nvPr>
+            <p:ph type="title"/>
+          </p:nvPr>
+        </p:nvSpPr>
+        <p:spPr/>
+        <p:txBody>
+          <a:bodyPr>
+            <a:normAutofit/>
+          </a:bodyPr>
+          <a:lstStyle/>
+          <a:p>
+            <a:r>
+              <a:rPr lang="en-GB" dirty="0" smtClean="0"/>
+              <a:t>SignalR demo chat </a:t>
+            </a:r>
+            <a:r>
+              <a:rPr lang="en-GB" dirty="0" smtClean="0"/>
+              <a:t>application</a:t>
+            </a:r>
+            <a:endParaRPr lang="en-GB" dirty="0"/>
+          </a:p>
+        </p:txBody>
+      </p:sp>
+      <p:sp>
+        <p:nvSpPr>
+          <p:cNvPr id="3" name="Content Placeholder 2"/>
+          <p:cNvSpPr>
+            <a:spLocks noGrp="1"/>
+          </p:cNvSpPr>
+          <p:nvPr>
+            <p:ph idx="1"/>
+          </p:nvPr>
+        </p:nvSpPr>
+        <p:spPr/>
+        <p:txBody>
+          <a:bodyPr>
+            <a:normAutofit/>
+          </a:bodyPr>
+          <a:lstStyle/>
+          <a:p>
+            <a:r>
+              <a:rPr lang="en-GB" dirty="0" smtClean="0">
+                <a:latin typeface="+mj-lt"/>
+              </a:rPr>
+              <a:t>As we will </a:t>
+            </a:r>
+            <a:r>
+              <a:rPr lang="en-GB" dirty="0">
+                <a:latin typeface="+mj-lt"/>
+              </a:rPr>
+              <a:t>be using </a:t>
+            </a:r>
+            <a:r>
+              <a:rPr lang="en-GB" dirty="0" smtClean="0">
+                <a:latin typeface="+mj-lt"/>
+              </a:rPr>
+              <a:t>IIS on Windows 7, we won’t </a:t>
+            </a:r>
+            <a:r>
+              <a:rPr lang="en-GB" dirty="0">
+                <a:latin typeface="+mj-lt"/>
+              </a:rPr>
+              <a:t>actually be using true WebSocket functionality, although the effect will be the same, as SignalR silently falls back to older technologies when WebSocket isn’t available.</a:t>
+            </a:r>
+          </a:p>
+        </p:txBody>
+      </p:sp>
+    </p:spTree>
+    <p:extLst>
+      <p:ext uri="{BB962C8B-B14F-4D97-AF65-F5344CB8AC3E}">
+        <p14:creationId xmlns:p14="http://schemas.microsoft.com/office/powerpoint/2010/main" val="2280917057"/>
       </p:ext>
     </p:extLst>
   </p:cSld>
@@ -4942,6 +5467,13 @@
   <p:clrMapOvr>
     <a:masterClrMapping/>
   </p:clrMapOvr>
+  <p:timing>
+    <p:tnLst>
+      <p:par>
+        <p:cTn id="1" dur="indefinite" restart="never" nodeType="tmRoot"/>
+      </p:par>
+    </p:tnLst>
+  </p:timing>
 </p:sld>
 </file>
 
@@ -5026,6 +5558,13 @@
   <p:clrMapOvr>
     <a:masterClrMapping/>
   </p:clrMapOvr>
+  <p:timing>
+    <p:tnLst>
+      <p:par>
+        <p:cTn id="1" dur="indefinite" restart="never" nodeType="tmRoot"/>
+      </p:par>
+    </p:tnLst>
+  </p:timing>
 </p:sld>
 </file>
 
@@ -5107,6 +5646,13 @@
   <p:clrMapOvr>
     <a:masterClrMapping/>
   </p:clrMapOvr>
+  <p:timing>
+    <p:tnLst>
+      <p:par>
+        <p:cTn id="1" dur="indefinite" restart="never" nodeType="tmRoot"/>
+      </p:par>
+    </p:tnLst>
+  </p:timing>
 </p:sld>
 </file>
 
@@ -5242,6 +5788,13 @@
   <p:clrMapOvr>
     <a:masterClrMapping/>
   </p:clrMapOvr>
+  <p:timing>
+    <p:tnLst>
+      <p:par>
+        <p:cTn id="1" dur="indefinite" restart="never" nodeType="tmRoot"/>
+      </p:par>
+    </p:tnLst>
+  </p:timing>
 </p:sld>
 </file>
 
@@ -5301,12 +5854,9 @@
           </a:bodyPr>
           <a:lstStyle/>
           <a:p>
-            <a:r>
-              <a:rPr lang="en-GB" dirty="0">
-                <a:latin typeface="+mj-lt"/>
-              </a:rPr>
-              <a:t>The browser and server do not poll for messages as they would need to do with connectionless HTTP. Instead, the connection remains open and they “listen” for incoming messages with an event handler, which is triggered when a message arrives.</a:t>
-            </a:r>
+            <a:endParaRPr lang="en-GB" dirty="0">
+              <a:latin typeface="+mj-lt"/>
+            </a:endParaRPr>
           </a:p>
         </p:txBody>
       </p:sp>
@@ -5320,6 +5870,13 @@
   <p:clrMapOvr>
     <a:masterClrMapping/>
   </p:clrMapOvr>
+  <p:timing>
+    <p:tnLst>
+      <p:par>
+        <p:cTn id="1" dur="indefinite" restart="never" nodeType="tmRoot"/>
+      </p:par>
+    </p:tnLst>
+  </p:timing>
 </p:sld>
 </file>
 
@@ -5380,35 +5937,67 @@
           <a:lstStyle/>
           <a:p>
             <a:r>
+              <a:rPr lang="en-GB" dirty="0">
+                <a:latin typeface="+mj-lt"/>
+              </a:rPr>
+              <a:t>The browser and server do </a:t>
+            </a:r>
+            <a:r>
               <a:rPr lang="en-GB" smtClean="0">
                 <a:latin typeface="+mj-lt"/>
               </a:rPr>
-              <a:t>The WebSocket </a:t>
+              <a:t>not need </a:t>
+            </a:r>
+            <a:r>
+              <a:rPr lang="en-GB" dirty="0" smtClean="0">
+                <a:latin typeface="+mj-lt"/>
+              </a:rPr>
+              <a:t>to repeatedly </a:t>
             </a:r>
             <a:r>
               <a:rPr lang="en-GB" dirty="0">
                 <a:latin typeface="+mj-lt"/>
               </a:rPr>
-              <a:t>protocol makes more interaction between a browser and a server possible, enabling live content and the creation of real-time applications. This is made possible by allowing messages to be passed back and forth over the open connection.</a:t>
-            </a:r>
-          </a:p>
-          <a:p>
-            <a:endParaRPr lang="en-GB" dirty="0">
-              <a:latin typeface="+mj-lt"/>
-            </a:endParaRPr>
+              <a:t>poll for messages as they would need </a:t>
+            </a:r>
+            <a:r>
+              <a:rPr lang="en-GB">
+                <a:latin typeface="+mj-lt"/>
+              </a:rPr>
+              <a:t>to </a:t>
+            </a:r>
+            <a:r>
+              <a:rPr lang="en-GB" smtClean="0">
+                <a:latin typeface="+mj-lt"/>
+              </a:rPr>
+              <a:t>with </a:t>
+            </a:r>
+            <a:r>
+              <a:rPr lang="en-GB" dirty="0">
+                <a:latin typeface="+mj-lt"/>
+              </a:rPr>
+              <a:t>connectionless HTTP. Instead, the connection remains open and they “listen” for incoming messages with an event handler, which is triggered when a message arrives.</a:t>
+            </a:r>
           </a:p>
         </p:txBody>
       </p:sp>
     </p:spTree>
     <p:extLst>
       <p:ext uri="{BB962C8B-B14F-4D97-AF65-F5344CB8AC3E}">
-        <p14:creationId xmlns:p14="http://schemas.microsoft.com/office/powerpoint/2010/main" val="4028601863"/>
+        <p14:creationId xmlns:p14="http://schemas.microsoft.com/office/powerpoint/2010/main" val="2233514822"/>
       </p:ext>
     </p:extLst>
   </p:cSld>
   <p:clrMapOvr>
     <a:masterClrMapping/>
   </p:clrMapOvr>
+  <p:timing>
+    <p:tnLst>
+      <p:par>
+        <p:cTn id="1" dur="indefinite" restart="never" nodeType="tmRoot"/>
+      </p:par>
+    </p:tnLst>
+  </p:timing>
 </p:sld>
 </file>
 
@@ -5469,35 +6058,19 @@
           <a:lstStyle/>
           <a:p>
             <a:r>
-              <a:rPr lang="en-GB" dirty="0" smtClean="0">
-                <a:latin typeface="+mj-lt"/>
-              </a:rPr>
-              <a:t>As </a:t>
+              <a:rPr lang="en-GB" smtClean="0">
+                <a:latin typeface="+mj-lt"/>
+              </a:rPr>
+              <a:t>The WebSocket </a:t>
             </a:r>
             <a:r>
               <a:rPr lang="en-GB" dirty="0">
                 <a:latin typeface="+mj-lt"/>
               </a:rPr>
-              <a:t>communication is done over TCP port </a:t>
-            </a:r>
-            <a:r>
-              <a:rPr lang="en-GB" dirty="0" smtClean="0">
-                <a:latin typeface="+mj-lt"/>
-              </a:rPr>
-              <a:t>80/443, </a:t>
-            </a:r>
-            <a:r>
-              <a:rPr lang="en-GB" dirty="0">
-                <a:latin typeface="+mj-lt"/>
-              </a:rPr>
-              <a:t>this benefits those environments where non-web Internet communication is blocked by a firewall</a:t>
-            </a:r>
-            <a:r>
-              <a:rPr lang="en-GB" dirty="0" smtClean="0">
-                <a:latin typeface="+mj-lt"/>
-              </a:rPr>
-              <a:t>.</a:t>
-            </a:r>
+              <a:t>protocol makes more interaction between a browser and a server possible, enabling live content and the creation of real-time applications. This is made possible by allowing messages to be passed back and forth over the open connection.</a:t>
+            </a:r>
+          </a:p>
+          <a:p>
             <a:endParaRPr lang="en-GB" dirty="0">
               <a:latin typeface="+mj-lt"/>
             </a:endParaRPr>
@@ -5507,13 +6080,20 @@
     </p:spTree>
     <p:extLst>
       <p:ext uri="{BB962C8B-B14F-4D97-AF65-F5344CB8AC3E}">
-        <p14:creationId xmlns:p14="http://schemas.microsoft.com/office/powerpoint/2010/main" val="814109854"/>
+        <p14:creationId xmlns:p14="http://schemas.microsoft.com/office/powerpoint/2010/main" val="4028601863"/>
       </p:ext>
     </p:extLst>
   </p:cSld>
   <p:clrMapOvr>
     <a:masterClrMapping/>
   </p:clrMapOvr>
+  <p:timing>
+    <p:tnLst>
+      <p:par>
+        <p:cTn id="1" dur="indefinite" restart="never" nodeType="tmRoot"/>
+      </p:par>
+    </p:tnLst>
+  </p:timing>
 </p:sld>
 </file>
 

</xml_diff>